<commit_message>
Created component file and welcome file
Welcome component created - version 1
</commit_message>
<xml_diff>
--- a/022_91893+_+91897+Documentation.pptx
+++ b/022_91893+_+91897+Documentation.pptx
@@ -5,7 +5,7 @@
     <p:sldMasterId id="2147483659" r:id="rId1"/>
   </p:sldMasterIdLst>
   <p:notesMasterIdLst>
-    <p:notesMasterId r:id="rId9"/>
+    <p:notesMasterId r:id="rId11"/>
   </p:notesMasterIdLst>
   <p:sldIdLst>
     <p:sldId id="256" r:id="rId2"/>
@@ -13,8 +13,10 @@
     <p:sldId id="258" r:id="rId4"/>
     <p:sldId id="259" r:id="rId5"/>
     <p:sldId id="260" r:id="rId6"/>
-    <p:sldId id="261" r:id="rId7"/>
-    <p:sldId id="262" r:id="rId8"/>
+    <p:sldId id="263" r:id="rId7"/>
+    <p:sldId id="264" r:id="rId8"/>
+    <p:sldId id="261" r:id="rId9"/>
+    <p:sldId id="262" r:id="rId10"/>
   </p:sldIdLst>
   <p:sldSz cx="9144000" cy="5143500" type="screen16x9"/>
   <p:notesSz cx="6858000" cy="9144000"/>
@@ -1309,6 +1311,224 @@
   <p:cSld>
     <p:spTree>
       <p:nvGrpSpPr>
+        <p:cNvPr id="1" name="Shape 69"/>
+        <p:cNvGrpSpPr/>
+        <p:nvPr/>
+      </p:nvGrpSpPr>
+      <p:grpSpPr>
+        <a:xfrm>
+          <a:off x="0" y="0"/>
+          <a:ext cx="0" cy="0"/>
+          <a:chOff x="0" y="0"/>
+          <a:chExt cx="0" cy="0"/>
+        </a:xfrm>
+      </p:grpSpPr>
+      <p:sp>
+        <p:nvSpPr>
+          <p:cNvPr id="70" name="Google Shape;70;gac10fef634_0_16:notes"/>
+          <p:cNvSpPr>
+            <a:spLocks noGrp="1" noRot="1" noChangeAspect="1"/>
+          </p:cNvSpPr>
+          <p:nvPr>
+            <p:ph type="sldImg" idx="2"/>
+          </p:nvPr>
+        </p:nvSpPr>
+        <p:spPr>
+          <a:xfrm>
+            <a:off x="381000" y="685800"/>
+            <a:ext cx="6096000" cy="3429000"/>
+          </a:xfrm>
+          <a:custGeom>
+            <a:avLst/>
+            <a:gdLst/>
+            <a:ahLst/>
+            <a:cxnLst/>
+            <a:rect l="l" t="t" r="r" b="b"/>
+            <a:pathLst>
+              <a:path w="120000" h="120000" extrusionOk="0">
+                <a:moveTo>
+                  <a:pt x="0" y="0"/>
+                </a:moveTo>
+                <a:lnTo>
+                  <a:pt x="120000" y="0"/>
+                </a:lnTo>
+                <a:lnTo>
+                  <a:pt x="120000" y="120000"/>
+                </a:lnTo>
+                <a:lnTo>
+                  <a:pt x="0" y="120000"/>
+                </a:lnTo>
+                <a:close/>
+              </a:path>
+            </a:pathLst>
+          </a:custGeom>
+        </p:spPr>
+      </p:sp>
+      <p:sp>
+        <p:nvSpPr>
+          <p:cNvPr id="71" name="Google Shape;71;gac10fef634_0_16:notes"/>
+          <p:cNvSpPr txBox="1">
+            <a:spLocks noGrp="1"/>
+          </p:cNvSpPr>
+          <p:nvPr>
+            <p:ph type="body" idx="1"/>
+          </p:nvPr>
+        </p:nvSpPr>
+        <p:spPr>
+          <a:xfrm>
+            <a:off x="685800" y="4343400"/>
+            <a:ext cx="5486400" cy="4114800"/>
+          </a:xfrm>
+          <a:prstGeom prst="rect">
+            <a:avLst/>
+          </a:prstGeom>
+        </p:spPr>
+        <p:txBody>
+          <a:bodyPr spcFirstLastPara="1" wrap="square" lIns="91425" tIns="91425" rIns="91425" bIns="91425" anchor="t" anchorCtr="0">
+            <a:noAutofit/>
+          </a:bodyPr>
+          <a:lstStyle/>
+          <a:p>
+            <a:pPr marL="0" lvl="0" indent="0" algn="l" rtl="0">
+              <a:spcBef>
+                <a:spcPts val="0"/>
+              </a:spcBef>
+              <a:spcAft>
+                <a:spcPts val="0"/>
+              </a:spcAft>
+              <a:buNone/>
+            </a:pPr>
+            <a:endParaRPr/>
+          </a:p>
+        </p:txBody>
+      </p:sp>
+    </p:spTree>
+    <p:extLst>
+      <p:ext uri="{BB962C8B-B14F-4D97-AF65-F5344CB8AC3E}">
+        <p14:creationId xmlns:p14="http://schemas.microsoft.com/office/powerpoint/2010/main" val="1054709350"/>
+      </p:ext>
+    </p:extLst>
+  </p:cSld>
+  <p:clrMapOvr>
+    <a:masterClrMapping/>
+  </p:clrMapOvr>
+</p:notes>
+</file>
+
+<file path=ppt/notesSlides/notesSlide7.xml><?xml version="1.0" encoding="utf-8"?>
+<p:notes xmlns:a="http://schemas.openxmlformats.org/drawingml/2006/main" xmlns:r="http://schemas.openxmlformats.org/officeDocument/2006/relationships" xmlns:p="http://schemas.openxmlformats.org/presentationml/2006/main" showMasterSp="0" showMasterPhAnim="0">
+  <p:cSld>
+    <p:spTree>
+      <p:nvGrpSpPr>
+        <p:cNvPr id="1" name="Shape 74"/>
+        <p:cNvGrpSpPr/>
+        <p:nvPr/>
+      </p:nvGrpSpPr>
+      <p:grpSpPr>
+        <a:xfrm>
+          <a:off x="0" y="0"/>
+          <a:ext cx="0" cy="0"/>
+          <a:chOff x="0" y="0"/>
+          <a:chExt cx="0" cy="0"/>
+        </a:xfrm>
+      </p:grpSpPr>
+      <p:sp>
+        <p:nvSpPr>
+          <p:cNvPr id="75" name="Google Shape;75;gac10fef634_0_20:notes"/>
+          <p:cNvSpPr>
+            <a:spLocks noGrp="1" noRot="1" noChangeAspect="1"/>
+          </p:cNvSpPr>
+          <p:nvPr>
+            <p:ph type="sldImg" idx="2"/>
+          </p:nvPr>
+        </p:nvSpPr>
+        <p:spPr>
+          <a:xfrm>
+            <a:off x="381000" y="685800"/>
+            <a:ext cx="6096000" cy="3429000"/>
+          </a:xfrm>
+          <a:custGeom>
+            <a:avLst/>
+            <a:gdLst/>
+            <a:ahLst/>
+            <a:cxnLst/>
+            <a:rect l="l" t="t" r="r" b="b"/>
+            <a:pathLst>
+              <a:path w="120000" h="120000" extrusionOk="0">
+                <a:moveTo>
+                  <a:pt x="0" y="0"/>
+                </a:moveTo>
+                <a:lnTo>
+                  <a:pt x="120000" y="0"/>
+                </a:lnTo>
+                <a:lnTo>
+                  <a:pt x="120000" y="120000"/>
+                </a:lnTo>
+                <a:lnTo>
+                  <a:pt x="0" y="120000"/>
+                </a:lnTo>
+                <a:close/>
+              </a:path>
+            </a:pathLst>
+          </a:custGeom>
+        </p:spPr>
+      </p:sp>
+      <p:sp>
+        <p:nvSpPr>
+          <p:cNvPr id="76" name="Google Shape;76;gac10fef634_0_20:notes"/>
+          <p:cNvSpPr txBox="1">
+            <a:spLocks noGrp="1"/>
+          </p:cNvSpPr>
+          <p:nvPr>
+            <p:ph type="body" idx="1"/>
+          </p:nvPr>
+        </p:nvSpPr>
+        <p:spPr>
+          <a:xfrm>
+            <a:off x="685800" y="4343400"/>
+            <a:ext cx="5486400" cy="4114800"/>
+          </a:xfrm>
+          <a:prstGeom prst="rect">
+            <a:avLst/>
+          </a:prstGeom>
+        </p:spPr>
+        <p:txBody>
+          <a:bodyPr spcFirstLastPara="1" wrap="square" lIns="91425" tIns="91425" rIns="91425" bIns="91425" anchor="t" anchorCtr="0">
+            <a:noAutofit/>
+          </a:bodyPr>
+          <a:lstStyle/>
+          <a:p>
+            <a:pPr marL="0" lvl="0" indent="0" algn="l" rtl="0">
+              <a:spcBef>
+                <a:spcPts val="0"/>
+              </a:spcBef>
+              <a:spcAft>
+                <a:spcPts val="0"/>
+              </a:spcAft>
+              <a:buNone/>
+            </a:pPr>
+            <a:endParaRPr/>
+          </a:p>
+        </p:txBody>
+      </p:sp>
+    </p:spTree>
+    <p:extLst>
+      <p:ext uri="{BB962C8B-B14F-4D97-AF65-F5344CB8AC3E}">
+        <p14:creationId xmlns:p14="http://schemas.microsoft.com/office/powerpoint/2010/main" val="3415522892"/>
+      </p:ext>
+    </p:extLst>
+  </p:cSld>
+  <p:clrMapOvr>
+    <a:masterClrMapping/>
+  </p:clrMapOvr>
+</p:notes>
+</file>
+
+<file path=ppt/notesSlides/notesSlide8.xml><?xml version="1.0" encoding="utf-8"?>
+<p:notes xmlns:a="http://schemas.openxmlformats.org/drawingml/2006/main" xmlns:r="http://schemas.openxmlformats.org/officeDocument/2006/relationships" xmlns:p="http://schemas.openxmlformats.org/presentationml/2006/main" showMasterSp="0" showMasterPhAnim="0">
+  <p:cSld>
+    <p:spTree>
+      <p:nvGrpSpPr>
         <p:cNvPr id="1" name="Shape 80"/>
         <p:cNvGrpSpPr/>
         <p:nvPr/>
@@ -1429,7 +1649,7 @@
 </p:notes>
 </file>
 
-<file path=ppt/notesSlides/notesSlide7.xml><?xml version="1.0" encoding="utf-8"?>
+<file path=ppt/notesSlides/notesSlide9.xml><?xml version="1.0" encoding="utf-8"?>
 <p:notes xmlns:a="http://schemas.openxmlformats.org/drawingml/2006/main" xmlns:r="http://schemas.openxmlformats.org/officeDocument/2006/relationships" xmlns:p="http://schemas.openxmlformats.org/presentationml/2006/main" showMasterSp="0" showMasterPhAnim="0">
   <p:cSld>
     <p:spTree>
@@ -6984,6 +7204,36 @@
           </a:p>
         </p:txBody>
       </p:sp>
+      <p:pic>
+        <p:nvPicPr>
+          <p:cNvPr id="5" name="Picture 4">
+            <a:extLst>
+              <a:ext uri="{FF2B5EF4-FFF2-40B4-BE49-F238E27FC236}">
+                <a16:creationId xmlns:a16="http://schemas.microsoft.com/office/drawing/2014/main" id="{F6DA28B8-C080-4206-9811-AEB8A5D93FB4}"/>
+              </a:ext>
+            </a:extLst>
+          </p:cNvPr>
+          <p:cNvPicPr>
+            <a:picLocks noChangeAspect="1"/>
+          </p:cNvPicPr>
+          <p:nvPr/>
+        </p:nvPicPr>
+        <p:blipFill>
+          <a:blip r:embed="rId3"/>
+          <a:stretch>
+            <a:fillRect/>
+          </a:stretch>
+        </p:blipFill>
+        <p:spPr>
+          <a:xfrm>
+            <a:off x="0" y="1272163"/>
+            <a:ext cx="9144000" cy="2599174"/>
+          </a:xfrm>
+          <a:prstGeom prst="rect">
+            <a:avLst/>
+          </a:prstGeom>
+        </p:spPr>
+      </p:pic>
     </p:spTree>
   </p:cSld>
   <p:clrMapOvr>
@@ -6993,6 +7243,370 @@
 </file>
 
 <file path=ppt/slides/slide5.xml><?xml version="1.0" encoding="utf-8"?>
+<p:sld xmlns:a="http://schemas.openxmlformats.org/drawingml/2006/main" xmlns:r="http://schemas.openxmlformats.org/officeDocument/2006/relationships" xmlns:p="http://schemas.openxmlformats.org/presentationml/2006/main">
+  <p:cSld>
+    <p:spTree>
+      <p:nvGrpSpPr>
+        <p:cNvPr id="1" name="Shape 77"/>
+        <p:cNvGrpSpPr/>
+        <p:nvPr/>
+      </p:nvGrpSpPr>
+      <p:grpSpPr>
+        <a:xfrm>
+          <a:off x="0" y="0"/>
+          <a:ext cx="0" cy="0"/>
+          <a:chOff x="0" y="0"/>
+          <a:chExt cx="0" cy="0"/>
+        </a:xfrm>
+      </p:grpSpPr>
+      <p:sp>
+        <p:nvSpPr>
+          <p:cNvPr id="78" name="Google Shape;78;p17"/>
+          <p:cNvSpPr txBox="1">
+            <a:spLocks noGrp="1"/>
+          </p:cNvSpPr>
+          <p:nvPr>
+            <p:ph type="title"/>
+          </p:nvPr>
+        </p:nvSpPr>
+        <p:spPr>
+          <a:xfrm>
+            <a:off x="311700" y="285537"/>
+            <a:ext cx="8520600" cy="572700"/>
+          </a:xfrm>
+          <a:prstGeom prst="rect">
+            <a:avLst/>
+          </a:prstGeom>
+        </p:spPr>
+        <p:txBody>
+          <a:bodyPr spcFirstLastPara="1" wrap="square" lIns="91425" tIns="91425" rIns="91425" bIns="91425" anchor="t" anchorCtr="0">
+            <a:noAutofit/>
+          </a:bodyPr>
+          <a:lstStyle/>
+          <a:p>
+            <a:pPr marL="0" lvl="0" indent="0" algn="l" rtl="0">
+              <a:spcBef>
+                <a:spcPts val="0"/>
+              </a:spcBef>
+              <a:spcAft>
+                <a:spcPts val="0"/>
+              </a:spcAft>
+              <a:buNone/>
+            </a:pPr>
+            <a:r>
+              <a:rPr lang="en" dirty="0"/>
+              <a:t>Component 1 - Test Plan (and screenshot)</a:t>
+            </a:r>
+            <a:endParaRPr dirty="0"/>
+          </a:p>
+        </p:txBody>
+      </p:sp>
+      <p:graphicFrame>
+        <p:nvGraphicFramePr>
+          <p:cNvPr id="79" name="Google Shape;79;p17"/>
+          <p:cNvGraphicFramePr/>
+          <p:nvPr>
+            <p:extLst>
+              <p:ext uri="{D42A27DB-BD31-4B8C-83A1-F6EECF244321}">
+                <p14:modId xmlns:p14="http://schemas.microsoft.com/office/powerpoint/2010/main" val="3862374292"/>
+              </p:ext>
+            </p:extLst>
+          </p:nvPr>
+        </p:nvGraphicFramePr>
+        <p:xfrm>
+          <a:off x="202019" y="3185999"/>
+          <a:ext cx="8520600" cy="1188660"/>
+        </p:xfrm>
+        <a:graphic>
+          <a:graphicData uri="http://schemas.openxmlformats.org/drawingml/2006/table">
+            <a:tbl>
+              <a:tblPr>
+                <a:noFill/>
+                <a:tableStyleId>{E1099E06-0E6B-448D-9D27-60429F06E6F4}</a:tableStyleId>
+              </a:tblPr>
+              <a:tblGrid>
+                <a:gridCol w="4260300">
+                  <a:extLst>
+                    <a:ext uri="{9D8B030D-6E8A-4147-A177-3AD203B41FA5}">
+                      <a16:colId xmlns:a16="http://schemas.microsoft.com/office/drawing/2014/main" val="20000"/>
+                    </a:ext>
+                  </a:extLst>
+                </a:gridCol>
+                <a:gridCol w="4260300">
+                  <a:extLst>
+                    <a:ext uri="{9D8B030D-6E8A-4147-A177-3AD203B41FA5}">
+                      <a16:colId xmlns:a16="http://schemas.microsoft.com/office/drawing/2014/main" val="20001"/>
+                    </a:ext>
+                  </a:extLst>
+                </a:gridCol>
+              </a:tblGrid>
+              <a:tr h="381000">
+                <a:tc>
+                  <a:txBody>
+                    <a:bodyPr/>
+                    <a:lstStyle/>
+                    <a:p>
+                      <a:pPr marL="0" lvl="0" indent="0" algn="l" rtl="0">
+                        <a:spcBef>
+                          <a:spcPts val="0"/>
+                        </a:spcBef>
+                        <a:spcAft>
+                          <a:spcPts val="0"/>
+                        </a:spcAft>
+                        <a:buNone/>
+                      </a:pPr>
+                      <a:r>
+                        <a:rPr lang="en" sz="1800" b="1" dirty="0"/>
+                        <a:t>Test Case</a:t>
+                      </a:r>
+                      <a:endParaRPr sz="1800" b="1" dirty="0"/>
+                    </a:p>
+                  </a:txBody>
+                  <a:tcPr marL="91425" marR="91425" marT="91425" marB="91425">
+                    <a:solidFill>
+                      <a:srgbClr val="CCCCCC"/>
+                    </a:solidFill>
+                  </a:tcPr>
+                </a:tc>
+                <a:tc>
+                  <a:txBody>
+                    <a:bodyPr/>
+                    <a:lstStyle/>
+                    <a:p>
+                      <a:pPr marL="0" lvl="0" indent="0" algn="l" rtl="0">
+                        <a:spcBef>
+                          <a:spcPts val="0"/>
+                        </a:spcBef>
+                        <a:spcAft>
+                          <a:spcPts val="0"/>
+                        </a:spcAft>
+                        <a:buNone/>
+                      </a:pPr>
+                      <a:r>
+                        <a:rPr lang="en" sz="1800" b="1"/>
+                        <a:t>Expected Values</a:t>
+                      </a:r>
+                      <a:endParaRPr sz="1800" b="1"/>
+                    </a:p>
+                  </a:txBody>
+                  <a:tcPr marL="91425" marR="91425" marT="91425" marB="91425">
+                    <a:solidFill>
+                      <a:srgbClr val="CCCCCC"/>
+                    </a:solidFill>
+                  </a:tcPr>
+                </a:tc>
+                <a:extLst>
+                  <a:ext uri="{0D108BD9-81ED-4DB2-BD59-A6C34878D82A}">
+                    <a16:rowId xmlns:a16="http://schemas.microsoft.com/office/drawing/2014/main" val="10000"/>
+                  </a:ext>
+                </a:extLst>
+              </a:tr>
+              <a:tr h="396200">
+                <a:tc>
+                  <a:txBody>
+                    <a:bodyPr/>
+                    <a:lstStyle/>
+                    <a:p>
+                      <a:pPr marL="0" lvl="0" indent="0" algn="l" rtl="0">
+                        <a:spcBef>
+                          <a:spcPts val="0"/>
+                        </a:spcBef>
+                        <a:spcAft>
+                          <a:spcPts val="0"/>
+                        </a:spcAft>
+                        <a:buNone/>
+                      </a:pPr>
+                      <a:r>
+                        <a:rPr lang="en-NZ" sz="1800" dirty="0"/>
+                        <a:t>Run Program </a:t>
+                      </a:r>
+                      <a:endParaRPr sz="1800" dirty="0"/>
+                    </a:p>
+                  </a:txBody>
+                  <a:tcPr marL="91425" marR="91425" marT="91425" marB="91425"/>
+                </a:tc>
+                <a:tc>
+                  <a:txBody>
+                    <a:bodyPr/>
+                    <a:lstStyle/>
+                    <a:p>
+                      <a:pPr marL="0" lvl="0" indent="0" algn="l" rtl="0">
+                        <a:spcBef>
+                          <a:spcPts val="0"/>
+                        </a:spcBef>
+                        <a:spcAft>
+                          <a:spcPts val="0"/>
+                        </a:spcAft>
+                        <a:buNone/>
+                      </a:pPr>
+                      <a:r>
+                        <a:rPr lang="en-NZ" sz="1800" dirty="0"/>
+                        <a:t>Print welcome message with random name from list of names – runs correctly</a:t>
+                      </a:r>
+                      <a:endParaRPr sz="1800" dirty="0"/>
+                    </a:p>
+                  </a:txBody>
+                  <a:tcPr marL="91425" marR="91425" marT="91425" marB="91425"/>
+                </a:tc>
+                <a:extLst>
+                  <a:ext uri="{0D108BD9-81ED-4DB2-BD59-A6C34878D82A}">
+                    <a16:rowId xmlns:a16="http://schemas.microsoft.com/office/drawing/2014/main" val="10001"/>
+                  </a:ext>
+                </a:extLst>
+              </a:tr>
+            </a:tbl>
+          </a:graphicData>
+        </a:graphic>
+      </p:graphicFrame>
+      <p:pic>
+        <p:nvPicPr>
+          <p:cNvPr id="3" name="Picture 2">
+            <a:extLst>
+              <a:ext uri="{FF2B5EF4-FFF2-40B4-BE49-F238E27FC236}">
+                <a16:creationId xmlns:a16="http://schemas.microsoft.com/office/drawing/2014/main" id="{0D3595FD-D436-44E6-ABD0-9C0B6068CB5E}"/>
+              </a:ext>
+            </a:extLst>
+          </p:cNvPr>
+          <p:cNvPicPr>
+            <a:picLocks noChangeAspect="1"/>
+          </p:cNvPicPr>
+          <p:nvPr/>
+        </p:nvPicPr>
+        <p:blipFill>
+          <a:blip r:embed="rId3"/>
+          <a:stretch>
+            <a:fillRect/>
+          </a:stretch>
+        </p:blipFill>
+        <p:spPr>
+          <a:xfrm>
+            <a:off x="311700" y="858238"/>
+            <a:ext cx="4908886" cy="1614766"/>
+          </a:xfrm>
+          <a:prstGeom prst="rect">
+            <a:avLst/>
+          </a:prstGeom>
+        </p:spPr>
+      </p:pic>
+      <p:pic>
+        <p:nvPicPr>
+          <p:cNvPr id="5" name="Picture 4">
+            <a:extLst>
+              <a:ext uri="{FF2B5EF4-FFF2-40B4-BE49-F238E27FC236}">
+                <a16:creationId xmlns:a16="http://schemas.microsoft.com/office/drawing/2014/main" id="{AA6A6311-C520-47E1-9627-06C9F2159B6B}"/>
+              </a:ext>
+            </a:extLst>
+          </p:cNvPr>
+          <p:cNvPicPr>
+            <a:picLocks noChangeAspect="1"/>
+          </p:cNvPicPr>
+          <p:nvPr/>
+        </p:nvPicPr>
+        <p:blipFill>
+          <a:blip r:embed="rId4"/>
+          <a:stretch>
+            <a:fillRect/>
+          </a:stretch>
+        </p:blipFill>
+        <p:spPr>
+          <a:xfrm>
+            <a:off x="5337544" y="1043161"/>
+            <a:ext cx="3611714" cy="622460"/>
+          </a:xfrm>
+          <a:prstGeom prst="rect">
+            <a:avLst/>
+          </a:prstGeom>
+        </p:spPr>
+      </p:pic>
+    </p:spTree>
+  </p:cSld>
+  <p:clrMapOvr>
+    <a:masterClrMapping/>
+  </p:clrMapOvr>
+</p:sld>
+</file>
+
+<file path=ppt/slides/slide6.xml><?xml version="1.0" encoding="utf-8"?>
+<p:sld xmlns:a="http://schemas.openxmlformats.org/drawingml/2006/main" xmlns:r="http://schemas.openxmlformats.org/officeDocument/2006/relationships" xmlns:p="http://schemas.openxmlformats.org/presentationml/2006/main">
+  <p:cSld>
+    <p:bg>
+      <p:bgPr>
+        <a:solidFill>
+          <a:srgbClr val="D9EAD3"/>
+        </a:solidFill>
+        <a:effectLst/>
+      </p:bgPr>
+    </p:bg>
+    <p:spTree>
+      <p:nvGrpSpPr>
+        <p:cNvPr id="1" name="Shape 72"/>
+        <p:cNvGrpSpPr/>
+        <p:nvPr/>
+      </p:nvGrpSpPr>
+      <p:grpSpPr>
+        <a:xfrm>
+          <a:off x="0" y="0"/>
+          <a:ext cx="0" cy="0"/>
+          <a:chOff x="0" y="0"/>
+          <a:chExt cx="0" cy="0"/>
+        </a:xfrm>
+      </p:grpSpPr>
+      <p:sp>
+        <p:nvSpPr>
+          <p:cNvPr id="73" name="Google Shape;73;p16"/>
+          <p:cNvSpPr txBox="1">
+            <a:spLocks noGrp="1"/>
+          </p:cNvSpPr>
+          <p:nvPr>
+            <p:ph type="title"/>
+          </p:nvPr>
+        </p:nvSpPr>
+        <p:spPr>
+          <a:xfrm>
+            <a:off x="311700" y="445025"/>
+            <a:ext cx="8520600" cy="572700"/>
+          </a:xfrm>
+          <a:prstGeom prst="rect">
+            <a:avLst/>
+          </a:prstGeom>
+        </p:spPr>
+        <p:txBody>
+          <a:bodyPr spcFirstLastPara="1" wrap="square" lIns="91425" tIns="91425" rIns="91425" bIns="91425" anchor="t" anchorCtr="0">
+            <a:noAutofit/>
+          </a:bodyPr>
+          <a:lstStyle/>
+          <a:p>
+            <a:pPr marL="0" lvl="0" indent="0" algn="l" rtl="0">
+              <a:spcBef>
+                <a:spcPts val="0"/>
+              </a:spcBef>
+              <a:spcAft>
+                <a:spcPts val="0"/>
+              </a:spcAft>
+              <a:buNone/>
+            </a:pPr>
+            <a:r>
+              <a:rPr lang="en" dirty="0"/>
+              <a:t>Component 2 (Trello screenshot)</a:t>
+            </a:r>
+            <a:endParaRPr dirty="0"/>
+          </a:p>
+        </p:txBody>
+      </p:sp>
+    </p:spTree>
+    <p:extLst>
+      <p:ext uri="{BB962C8B-B14F-4D97-AF65-F5344CB8AC3E}">
+        <p14:creationId xmlns:p14="http://schemas.microsoft.com/office/powerpoint/2010/main" val="2240161383"/>
+      </p:ext>
+    </p:extLst>
+  </p:cSld>
+  <p:clrMapOvr>
+    <a:masterClrMapping/>
+  </p:clrMapOvr>
+</p:sld>
+</file>
+
+<file path=ppt/slides/slide7.xml><?xml version="1.0" encoding="utf-8"?>
 <p:sld xmlns:a="http://schemas.openxmlformats.org/drawingml/2006/main" xmlns:r="http://schemas.openxmlformats.org/officeDocument/2006/relationships" xmlns:p="http://schemas.openxmlformats.org/presentationml/2006/main">
   <p:cSld>
     <p:spTree>
@@ -7044,10 +7658,10 @@
               <a:buNone/>
             </a:pPr>
             <a:r>
-              <a:rPr lang="en"/>
-              <a:t>Component 1 - Test Plan (?and screenshot)</a:t>
+              <a:rPr lang="en" dirty="0"/>
+              <a:t>Component 2 - Test Plan (?and screenshot)</a:t>
             </a:r>
-            <a:endParaRPr/>
+            <a:endParaRPr dirty="0"/>
           </a:p>
         </p:txBody>
       </p:sp>
@@ -7195,6 +7809,11 @@
         </a:graphic>
       </p:graphicFrame>
     </p:spTree>
+    <p:extLst>
+      <p:ext uri="{BB962C8B-B14F-4D97-AF65-F5344CB8AC3E}">
+        <p14:creationId xmlns:p14="http://schemas.microsoft.com/office/powerpoint/2010/main" val="286548097"/>
+      </p:ext>
+    </p:extLst>
   </p:cSld>
   <p:clrMapOvr>
     <a:masterClrMapping/>
@@ -7202,7 +7821,7 @@
 </p:sld>
 </file>
 
-<file path=ppt/slides/slide6.xml><?xml version="1.0" encoding="utf-8"?>
+<file path=ppt/slides/slide8.xml><?xml version="1.0" encoding="utf-8"?>
 <p:sld xmlns:a="http://schemas.openxmlformats.org/drawingml/2006/main" xmlns:r="http://schemas.openxmlformats.org/officeDocument/2006/relationships" xmlns:p="http://schemas.openxmlformats.org/presentationml/2006/main">
   <p:cSld>
     <p:bg>
@@ -7319,7 +7938,7 @@
 </p:sld>
 </file>
 
-<file path=ppt/slides/slide7.xml><?xml version="1.0" encoding="utf-8"?>
+<file path=ppt/slides/slide9.xml><?xml version="1.0" encoding="utf-8"?>
 <p:sld xmlns:a="http://schemas.openxmlformats.org/drawingml/2006/main" xmlns:r="http://schemas.openxmlformats.org/officeDocument/2006/relationships" xmlns:p="http://schemas.openxmlformats.org/presentationml/2006/main">
   <p:cSld>
     <p:bg>

</xml_diff>